<commit_message>
added intelligent tab completion. we store how frequent each pattern element is hit by another element. fix #167
</commit_message>
<xml_diff>
--- a/documentation/documentation.pptx
+++ b/documentation/documentation.pptx
@@ -226,7 +226,7 @@
           <a:p>
             <a:fld id="{182B0580-DB61-44AB-B196-D97E3857AAB5}" type="datetimeFigureOut">
               <a:rPr lang="en-US" smtClean="0"/>
-              <a:t>5/5/2025</a:t>
+              <a:t>5/6/2025</a:t>
             </a:fld>
             <a:endParaRPr lang="en-US" dirty="0"/>
           </a:p>
@@ -724,7 +724,7 @@
           <a:p>
             <a:fld id="{DD9669F0-B532-4999-9248-F1C38B555120}" type="datetimeFigureOut">
               <a:rPr lang="en-US" smtClean="0"/>
-              <a:t>5/5/2025</a:t>
+              <a:t>5/6/2025</a:t>
             </a:fld>
             <a:endParaRPr lang="en-US" dirty="0"/>
           </a:p>
@@ -922,7 +922,7 @@
           <a:p>
             <a:fld id="{DD9669F0-B532-4999-9248-F1C38B555120}" type="datetimeFigureOut">
               <a:rPr lang="en-US" smtClean="0"/>
-              <a:t>5/5/2025</a:t>
+              <a:t>5/6/2025</a:t>
             </a:fld>
             <a:endParaRPr lang="en-US" dirty="0"/>
           </a:p>
@@ -1130,7 +1130,7 @@
           <a:p>
             <a:fld id="{DD9669F0-B532-4999-9248-F1C38B555120}" type="datetimeFigureOut">
               <a:rPr lang="en-US" smtClean="0"/>
-              <a:t>5/5/2025</a:t>
+              <a:t>5/6/2025</a:t>
             </a:fld>
             <a:endParaRPr lang="en-US" dirty="0"/>
           </a:p>
@@ -1328,7 +1328,7 @@
           <a:p>
             <a:fld id="{DD9669F0-B532-4999-9248-F1C38B555120}" type="datetimeFigureOut">
               <a:rPr lang="en-US" smtClean="0"/>
-              <a:t>5/5/2025</a:t>
+              <a:t>5/6/2025</a:t>
             </a:fld>
             <a:endParaRPr lang="en-US" dirty="0"/>
           </a:p>
@@ -1603,7 +1603,7 @@
           <a:p>
             <a:fld id="{DD9669F0-B532-4999-9248-F1C38B555120}" type="datetimeFigureOut">
               <a:rPr lang="en-US" smtClean="0"/>
-              <a:t>5/5/2025</a:t>
+              <a:t>5/6/2025</a:t>
             </a:fld>
             <a:endParaRPr lang="en-US" dirty="0"/>
           </a:p>
@@ -1868,7 +1868,7 @@
           <a:p>
             <a:fld id="{DD9669F0-B532-4999-9248-F1C38B555120}" type="datetimeFigureOut">
               <a:rPr lang="en-US" smtClean="0"/>
-              <a:t>5/5/2025</a:t>
+              <a:t>5/6/2025</a:t>
             </a:fld>
             <a:endParaRPr lang="en-US" dirty="0"/>
           </a:p>
@@ -2280,7 +2280,7 @@
           <a:p>
             <a:fld id="{DD9669F0-B532-4999-9248-F1C38B555120}" type="datetimeFigureOut">
               <a:rPr lang="en-US" smtClean="0"/>
-              <a:t>5/5/2025</a:t>
+              <a:t>5/6/2025</a:t>
             </a:fld>
             <a:endParaRPr lang="en-US" dirty="0"/>
           </a:p>
@@ -2421,7 +2421,7 @@
           <a:p>
             <a:fld id="{DD9669F0-B532-4999-9248-F1C38B555120}" type="datetimeFigureOut">
               <a:rPr lang="en-US" smtClean="0"/>
-              <a:t>5/5/2025</a:t>
+              <a:t>5/6/2025</a:t>
             </a:fld>
             <a:endParaRPr lang="en-US" dirty="0"/>
           </a:p>
@@ -2534,7 +2534,7 @@
           <a:p>
             <a:fld id="{DD9669F0-B532-4999-9248-F1C38B555120}" type="datetimeFigureOut">
               <a:rPr lang="en-US" smtClean="0"/>
-              <a:t>5/5/2025</a:t>
+              <a:t>5/6/2025</a:t>
             </a:fld>
             <a:endParaRPr lang="en-US" dirty="0"/>
           </a:p>
@@ -2845,7 +2845,7 @@
           <a:p>
             <a:fld id="{DD9669F0-B532-4999-9248-F1C38B555120}" type="datetimeFigureOut">
               <a:rPr lang="en-US" smtClean="0"/>
-              <a:t>5/5/2025</a:t>
+              <a:t>5/6/2025</a:t>
             </a:fld>
             <a:endParaRPr lang="en-US" dirty="0"/>
           </a:p>
@@ -3133,7 +3133,7 @@
           <a:p>
             <a:fld id="{DD9669F0-B532-4999-9248-F1C38B555120}" type="datetimeFigureOut">
               <a:rPr lang="en-US" smtClean="0"/>
-              <a:t>5/5/2025</a:t>
+              <a:t>5/6/2025</a:t>
             </a:fld>
             <a:endParaRPr lang="en-US" dirty="0"/>
           </a:p>
@@ -3374,7 +3374,7 @@
           <a:p>
             <a:fld id="{DD9669F0-B532-4999-9248-F1C38B555120}" type="datetimeFigureOut">
               <a:rPr lang="en-US" smtClean="0"/>
-              <a:t>5/5/2025</a:t>
+              <a:t>5/6/2025</a:t>
             </a:fld>
             <a:endParaRPr lang="en-US" dirty="0"/>
           </a:p>
@@ -11471,8 +11471,8 @@
         </p:nvSpPr>
         <p:spPr>
           <a:xfrm>
-            <a:off x="1783080" y="1417320"/>
-            <a:ext cx="9637776" cy="1754326"/>
+            <a:off x="566928" y="1234440"/>
+            <a:ext cx="9637776" cy="2031325"/>
           </a:xfrm>
           <a:prstGeom prst="rect">
             <a:avLst/>
@@ -11487,7 +11487,7 @@
           <a:p>
             <a:r>
               <a:rPr lang="en-US" dirty="0"/>
-              <a:t>Because each tree is traversed separately, we can’t first traverse another tree and when we don’t find any options anymore, get back to the original tree and substitute.</a:t>
+              <a:t>Because each tree is traversed separately, we can’t first traverse another tree and when we don’t find any options anymore, get back to the original tree and substitute. Also, locally declared similar patterns should be checked out first.</a:t>
             </a:r>
           </a:p>
           <a:p>
@@ -11500,6 +11500,97 @@
             <a:r>
               <a:rPr lang="en-US" dirty="0"/>
               <a:t>But even then, we’ll need a way for tab completions to be more relevant, like some sort of algorithm.</a:t>
+            </a:r>
+          </a:p>
+        </p:txBody>
+      </p:sp>
+      <p:sp>
+        <p:nvSpPr>
+          <p:cNvPr id="3" name="TextBox 2">
+            <a:extLst>
+              <a:ext uri="{FF2B5EF4-FFF2-40B4-BE49-F238E27FC236}">
+                <a16:creationId xmlns:a16="http://schemas.microsoft.com/office/drawing/2014/main" id="{AC1FE67E-74A6-45E8-6F9B-5B53EC14B729}"/>
+              </a:ext>
+            </a:extLst>
+          </p:cNvPr>
+          <p:cNvSpPr txBox="1"/>
+          <p:nvPr/>
+        </p:nvSpPr>
+        <p:spPr>
+          <a:xfrm>
+            <a:off x="655320" y="3429000"/>
+            <a:ext cx="9637776" cy="2308324"/>
+          </a:xfrm>
+          <a:prstGeom prst="rect">
+            <a:avLst/>
+          </a:prstGeom>
+          <a:noFill/>
+        </p:spPr>
+        <p:txBody>
+          <a:bodyPr wrap="square" rtlCol="0">
+            <a:spAutoFit/>
+          </a:bodyPr>
+          <a:lstStyle/>
+          <a:p>
+            <a:pPr marL="285750" indent="-285750">
+              <a:buFontTx/>
+              <a:buChar char="-"/>
+            </a:pPr>
+            <a:r>
+              <a:rPr lang="en-US" dirty="0"/>
+              <a:t>Use AI to tab complete</a:t>
+            </a:r>
+          </a:p>
+          <a:p>
+            <a:r>
+              <a:rPr lang="en-US" dirty="0"/>
+              <a:t>Would require us to leverage a free AI </a:t>
+            </a:r>
+            <a:r>
+              <a:rPr lang="en-US" dirty="0" err="1"/>
+              <a:t>api</a:t>
+            </a:r>
+            <a:r>
+              <a:rPr lang="en-US" dirty="0"/>
+              <a:t>. This probably wouldn’t be possible with many users.</a:t>
+            </a:r>
+          </a:p>
+          <a:p>
+            <a:pPr marL="285750" indent="-285750">
+              <a:buFontTx/>
+              <a:buChar char="-"/>
+            </a:pPr>
+            <a:r>
+              <a:rPr lang="en-US" dirty="0"/>
+              <a:t>Train our own AI to tab complete</a:t>
+            </a:r>
+          </a:p>
+          <a:p>
+            <a:r>
+              <a:rPr lang="en-US" dirty="0"/>
+              <a:t>Would require a lot of new code or a library to be installed. Would possibly degrade performance.</a:t>
+            </a:r>
+          </a:p>
+          <a:p>
+            <a:pPr marL="285750" indent="-285750">
+              <a:buFontTx/>
+              <a:buChar char="-"/>
+            </a:pPr>
+            <a:r>
+              <a:rPr lang="en-US" dirty="0"/>
+              <a:t>Generate probabilities by counting usage</a:t>
+            </a:r>
+          </a:p>
+          <a:p>
+            <a:r>
+              <a:rPr lang="en-US" dirty="0"/>
+              <a:t>Would take some code and would need updating when changing the code. Would be safer because we’re not dependent on some external libraries.</a:t>
+            </a:r>
+          </a:p>
+          <a:p>
+            <a:r>
+              <a:rPr lang="en-US" dirty="0"/>
+              <a:t>Would take less code and performance.</a:t>
             </a:r>
           </a:p>
         </p:txBody>

</xml_diff>

<commit_message>
added telemetry (for now, it'll only report activation of the extension). also expanded error information
</commit_message>
<xml_diff>
--- a/documentation/documentation.pptx
+++ b/documentation/documentation.pptx
@@ -11518,8 +11518,8 @@
         </p:nvSpPr>
         <p:spPr>
           <a:xfrm>
-            <a:off x="655320" y="3429000"/>
-            <a:ext cx="9637776" cy="2308324"/>
+            <a:off x="637032" y="3265765"/>
+            <a:ext cx="9637776" cy="3693319"/>
           </a:xfrm>
           <a:prstGeom prst="rect">
             <a:avLst/>
@@ -11556,6 +11556,34 @@
             </a:r>
           </a:p>
           <a:p>
+            <a:r>
+              <a:rPr lang="en-US" dirty="0"/>
+              <a:t>When using </a:t>
+            </a:r>
+            <a:r>
+              <a:rPr lang="en-US" dirty="0" err="1"/>
+              <a:t>textgenerationpipeline</a:t>
+            </a:r>
+            <a:r>
+              <a:rPr lang="en-US" dirty="0"/>
+              <a:t> from transformers as installed dependency, it makes the typescript linter lag and doesn’t work with webpack or web. It also costs a 700 kb of space.</a:t>
+            </a:r>
+          </a:p>
+          <a:p>
+            <a:r>
+              <a:rPr lang="en-US" dirty="0"/>
+              <a:t>Setting </a:t>
+            </a:r>
+            <a:r>
+              <a:rPr lang="en-US" dirty="0" err="1"/>
+              <a:t>xenova</a:t>
+            </a:r>
+            <a:r>
+              <a:rPr lang="en-US" dirty="0"/>
+              <a:t>/transformers up turns out to be hard, because one of their dependencies requires FS.</a:t>
+            </a:r>
+          </a:p>
+          <a:p>
             <a:pPr marL="285750" indent="-285750">
               <a:buFontTx/>
               <a:buChar char="-"/>
@@ -11591,6 +11619,12 @@
             <a:r>
               <a:rPr lang="en-US" dirty="0"/>
               <a:t>Would take less code and performance.</a:t>
+            </a:r>
+          </a:p>
+          <a:p>
+            <a:r>
+              <a:rPr lang="en-US" dirty="0"/>
+              <a:t>Wouldn’t be context aware.</a:t>
             </a:r>
           </a:p>
         </p:txBody>

</xml_diff>